<commit_message>
chore: add standalone docker-compose for Airflow orchestration
</commit_message>
<xml_diff>
--- a/docs/prensentation.pptx
+++ b/docs/prensentation.pptx
@@ -106,6 +106,11 @@
       </a:defRPr>
     </a:lvl9pPr>
   </p:defaultTextStyle>
+  <p:extLst>
+    <p:ext uri="{EFAFB233-063F-42B5-8137-9DF3F51BA10A}">
+      <p15:sldGuideLst xmlns:p15="http://schemas.microsoft.com/office/powerpoint/2012/main"/>
+    </p:ext>
+  </p:extLst>
 </p:presentation>
 </file>
 
@@ -256,7 +261,7 @@
           <a:p>
             <a:fld id="{C2A97B94-732B-4EB4-BE3C-A31B9C2E7D0F}" type="datetimeFigureOut">
               <a:rPr lang="fr-FR" smtClean="0"/>
-              <a:t>25/06/2025</a:t>
+              <a:t>04/07/2025</a:t>
             </a:fld>
             <a:endParaRPr lang="fr-FR"/>
           </a:p>
@@ -454,7 +459,7 @@
           <a:p>
             <a:fld id="{C2A97B94-732B-4EB4-BE3C-A31B9C2E7D0F}" type="datetimeFigureOut">
               <a:rPr lang="fr-FR" smtClean="0"/>
-              <a:t>25/06/2025</a:t>
+              <a:t>04/07/2025</a:t>
             </a:fld>
             <a:endParaRPr lang="fr-FR"/>
           </a:p>
@@ -662,7 +667,7 @@
           <a:p>
             <a:fld id="{C2A97B94-732B-4EB4-BE3C-A31B9C2E7D0F}" type="datetimeFigureOut">
               <a:rPr lang="fr-FR" smtClean="0"/>
-              <a:t>25/06/2025</a:t>
+              <a:t>04/07/2025</a:t>
             </a:fld>
             <a:endParaRPr lang="fr-FR"/>
           </a:p>
@@ -860,7 +865,7 @@
           <a:p>
             <a:fld id="{C2A97B94-732B-4EB4-BE3C-A31B9C2E7D0F}" type="datetimeFigureOut">
               <a:rPr lang="fr-FR" smtClean="0"/>
-              <a:t>25/06/2025</a:t>
+              <a:t>04/07/2025</a:t>
             </a:fld>
             <a:endParaRPr lang="fr-FR"/>
           </a:p>
@@ -1135,7 +1140,7 @@
           <a:p>
             <a:fld id="{C2A97B94-732B-4EB4-BE3C-A31B9C2E7D0F}" type="datetimeFigureOut">
               <a:rPr lang="fr-FR" smtClean="0"/>
-              <a:t>25/06/2025</a:t>
+              <a:t>04/07/2025</a:t>
             </a:fld>
             <a:endParaRPr lang="fr-FR"/>
           </a:p>
@@ -1400,7 +1405,7 @@
           <a:p>
             <a:fld id="{C2A97B94-732B-4EB4-BE3C-A31B9C2E7D0F}" type="datetimeFigureOut">
               <a:rPr lang="fr-FR" smtClean="0"/>
-              <a:t>25/06/2025</a:t>
+              <a:t>04/07/2025</a:t>
             </a:fld>
             <a:endParaRPr lang="fr-FR"/>
           </a:p>
@@ -1812,7 +1817,7 @@
           <a:p>
             <a:fld id="{C2A97B94-732B-4EB4-BE3C-A31B9C2E7D0F}" type="datetimeFigureOut">
               <a:rPr lang="fr-FR" smtClean="0"/>
-              <a:t>25/06/2025</a:t>
+              <a:t>04/07/2025</a:t>
             </a:fld>
             <a:endParaRPr lang="fr-FR"/>
           </a:p>
@@ -1953,7 +1958,7 @@
           <a:p>
             <a:fld id="{C2A97B94-732B-4EB4-BE3C-A31B9C2E7D0F}" type="datetimeFigureOut">
               <a:rPr lang="fr-FR" smtClean="0"/>
-              <a:t>25/06/2025</a:t>
+              <a:t>04/07/2025</a:t>
             </a:fld>
             <a:endParaRPr lang="fr-FR"/>
           </a:p>
@@ -2066,7 +2071,7 @@
           <a:p>
             <a:fld id="{C2A97B94-732B-4EB4-BE3C-A31B9C2E7D0F}" type="datetimeFigureOut">
               <a:rPr lang="fr-FR" smtClean="0"/>
-              <a:t>25/06/2025</a:t>
+              <a:t>04/07/2025</a:t>
             </a:fld>
             <a:endParaRPr lang="fr-FR"/>
           </a:p>
@@ -2377,7 +2382,7 @@
           <a:p>
             <a:fld id="{C2A97B94-732B-4EB4-BE3C-A31B9C2E7D0F}" type="datetimeFigureOut">
               <a:rPr lang="fr-FR" smtClean="0"/>
-              <a:t>25/06/2025</a:t>
+              <a:t>04/07/2025</a:t>
             </a:fld>
             <a:endParaRPr lang="fr-FR"/>
           </a:p>
@@ -2665,7 +2670,7 @@
           <a:p>
             <a:fld id="{C2A97B94-732B-4EB4-BE3C-A31B9C2E7D0F}" type="datetimeFigureOut">
               <a:rPr lang="fr-FR" smtClean="0"/>
-              <a:t>25/06/2025</a:t>
+              <a:t>04/07/2025</a:t>
             </a:fld>
             <a:endParaRPr lang="fr-FR"/>
           </a:p>
@@ -2906,7 +2911,7 @@
           <a:p>
             <a:fld id="{C2A97B94-732B-4EB4-BE3C-A31B9C2E7D0F}" type="datetimeFigureOut">
               <a:rPr lang="fr-FR" smtClean="0"/>
-              <a:t>25/06/2025</a:t>
+              <a:t>04/07/2025</a:t>
             </a:fld>
             <a:endParaRPr lang="fr-FR"/>
           </a:p>

</xml_diff>

<commit_message>
Add Airflow DAG pipeline_jours_bien_etre
</commit_message>
<xml_diff>
--- a/docs/prensentation.pptx
+++ b/docs/prensentation.pptx
@@ -3763,7 +3763,7 @@
         </p:blipFill>
         <p:spPr bwMode="auto">
           <a:xfrm>
-            <a:off x="8858581" y="4507418"/>
+            <a:off x="9044919" y="4507418"/>
             <a:ext cx="556850" cy="575295"/>
           </a:xfrm>
           <a:prstGeom prst="rect">
@@ -3975,7 +3975,7 @@
         </p:nvCxnSpPr>
         <p:spPr>
           <a:xfrm>
-            <a:off x="5289252" y="1610849"/>
+            <a:off x="5259756" y="1610849"/>
             <a:ext cx="1042876" cy="0"/>
           </a:xfrm>
           <a:prstGeom prst="straightConnector1">
@@ -4289,7 +4289,7 @@
         </p:nvSpPr>
         <p:spPr>
           <a:xfrm>
-            <a:off x="6922398" y="5117154"/>
+            <a:off x="6816446" y="5117154"/>
             <a:ext cx="1247578" cy="377046"/>
           </a:xfrm>
           <a:prstGeom prst="rect">
@@ -4340,7 +4340,7 @@
         <p:spPr>
           <a:xfrm>
             <a:off x="7970888" y="4795065"/>
-            <a:ext cx="739317" cy="0"/>
+            <a:ext cx="962622" cy="0"/>
           </a:xfrm>
           <a:prstGeom prst="straightConnector1">
             <a:avLst/>
@@ -4384,7 +4384,7 @@
         </p:nvSpPr>
         <p:spPr>
           <a:xfrm>
-            <a:off x="8805421" y="5117154"/>
+            <a:off x="8933510" y="5117154"/>
             <a:ext cx="779668" cy="377046"/>
           </a:xfrm>
           <a:prstGeom prst="rect">
@@ -4844,7 +4844,7 @@
         <p:spPr>
           <a:xfrm>
             <a:off x="7294171" y="3551162"/>
-            <a:ext cx="1474975" cy="962718"/>
+            <a:ext cx="1693297" cy="946185"/>
           </a:xfrm>
           <a:prstGeom prst="straightConnector1">
             <a:avLst/>
@@ -4892,7 +4892,7 @@
         <p:spPr>
           <a:xfrm flipH="1" flipV="1">
             <a:off x="7358211" y="3468758"/>
-            <a:ext cx="1410935" cy="914898"/>
+            <a:ext cx="1686708" cy="918395"/>
           </a:xfrm>
           <a:prstGeom prst="straightConnector1">
             <a:avLst/>
@@ -4937,7 +4937,7 @@
         </p:nvSpPr>
         <p:spPr>
           <a:xfrm>
-            <a:off x="7578438" y="5721316"/>
+            <a:off x="7547377" y="5709998"/>
             <a:ext cx="453220" cy="215455"/>
           </a:xfrm>
           <a:prstGeom prst="rect">
@@ -5143,8 +5143,8 @@
         </p:blipFill>
         <p:spPr>
           <a:xfrm>
-            <a:off x="8019764" y="4866535"/>
-            <a:ext cx="641562" cy="168206"/>
+            <a:off x="8019763" y="4866535"/>
+            <a:ext cx="955893" cy="250618"/>
           </a:xfrm>
           <a:prstGeom prst="rect">
             <a:avLst/>
@@ -5554,7 +5554,7 @@
         </p:blipFill>
         <p:spPr bwMode="auto">
           <a:xfrm>
-            <a:off x="4413372" y="1302817"/>
+            <a:off x="4511692" y="1302817"/>
             <a:ext cx="556850" cy="575295"/>
           </a:xfrm>
           <a:prstGeom prst="rect">
@@ -5631,7 +5631,7 @@
         </p:nvSpPr>
         <p:spPr>
           <a:xfrm>
-            <a:off x="4241168" y="1870477"/>
+            <a:off x="4289570" y="1857491"/>
             <a:ext cx="997388" cy="430887"/>
           </a:xfrm>
           <a:prstGeom prst="rect">

</xml_diff>

<commit_message>
Fix: ensure proper NULL handling for pratique_sportive in employees import
</commit_message>
<xml_diff>
--- a/docs/prensentation.pptx
+++ b/docs/prensentation.pptx
@@ -5766,7 +5766,45 @@
           <a:bodyPr/>
           <a:lstStyle/>
           <a:p>
-            <a:endParaRPr lang="fr-FR"/>
+            <a:r>
+              <a:rPr lang="fr-FR" dirty="0"/>
+              <a:t>docker-compose run --</a:t>
+            </a:r>
+            <a:r>
+              <a:rPr lang="fr-FR" dirty="0" err="1"/>
+              <a:t>rm</a:t>
+            </a:r>
+            <a:r>
+              <a:rPr lang="fr-FR" dirty="0"/>
+              <a:t> sport-consumer </a:t>
+            </a:r>
+            <a:r>
+              <a:rPr lang="fr-FR" dirty="0" err="1"/>
+              <a:t>bash</a:t>
+            </a:r>
+            <a:endParaRPr lang="fr-FR" dirty="0"/>
+          </a:p>
+          <a:p>
+            <a:r>
+              <a:rPr lang="fr-FR" dirty="0"/>
+              <a:t>python scripts/bien_etre/generate_sport_data.py --</a:t>
+            </a:r>
+            <a:r>
+              <a:rPr lang="fr-FR" dirty="0" err="1"/>
+              <a:t>nb_messages</a:t>
+            </a:r>
+            <a:r>
+              <a:rPr lang="fr-FR" dirty="0"/>
+              <a:t> 5 --</a:t>
+            </a:r>
+            <a:r>
+              <a:rPr lang="fr-FR" dirty="0" err="1"/>
+              <a:t>time_sleep</a:t>
+            </a:r>
+            <a:r>
+              <a:rPr lang="fr-FR" dirty="0"/>
+              <a:t> 2</a:t>
+            </a:r>
           </a:p>
         </p:txBody>
       </p:sp>

</xml_diff>